<commit_message>
update figures following ECCC review
</commit_message>
<xml_diff>
--- a/outputs/Fig1.pptx
+++ b/outputs/Fig1.pptx
@@ -243,7 +243,7 @@
           <a:p>
             <a:fld id="{52F7EFB8-6C6E-5041-9270-6951BF1704F9}" type="datetimeFigureOut">
               <a:rPr lang="en-US" smtClean="0"/>
-              <a:t>8/8/20</a:t>
+              <a:t>11/2/20</a:t>
             </a:fld>
             <a:endParaRPr lang="en-US"/>
           </a:p>
@@ -413,7 +413,7 @@
           <a:p>
             <a:fld id="{52F7EFB8-6C6E-5041-9270-6951BF1704F9}" type="datetimeFigureOut">
               <a:rPr lang="en-US" smtClean="0"/>
-              <a:t>8/8/20</a:t>
+              <a:t>11/2/20</a:t>
             </a:fld>
             <a:endParaRPr lang="en-US"/>
           </a:p>
@@ -593,7 +593,7 @@
           <a:p>
             <a:fld id="{52F7EFB8-6C6E-5041-9270-6951BF1704F9}" type="datetimeFigureOut">
               <a:rPr lang="en-US" smtClean="0"/>
-              <a:t>8/8/20</a:t>
+              <a:t>11/2/20</a:t>
             </a:fld>
             <a:endParaRPr lang="en-US"/>
           </a:p>
@@ -763,7 +763,7 @@
           <a:p>
             <a:fld id="{52F7EFB8-6C6E-5041-9270-6951BF1704F9}" type="datetimeFigureOut">
               <a:rPr lang="en-US" smtClean="0"/>
-              <a:t>8/8/20</a:t>
+              <a:t>11/2/20</a:t>
             </a:fld>
             <a:endParaRPr lang="en-US"/>
           </a:p>
@@ -1007,7 +1007,7 @@
           <a:p>
             <a:fld id="{52F7EFB8-6C6E-5041-9270-6951BF1704F9}" type="datetimeFigureOut">
               <a:rPr lang="en-US" smtClean="0"/>
-              <a:t>8/8/20</a:t>
+              <a:t>11/2/20</a:t>
             </a:fld>
             <a:endParaRPr lang="en-US"/>
           </a:p>
@@ -1239,7 +1239,7 @@
           <a:p>
             <a:fld id="{52F7EFB8-6C6E-5041-9270-6951BF1704F9}" type="datetimeFigureOut">
               <a:rPr lang="en-US" smtClean="0"/>
-              <a:t>8/8/20</a:t>
+              <a:t>11/2/20</a:t>
             </a:fld>
             <a:endParaRPr lang="en-US"/>
           </a:p>
@@ -1606,7 +1606,7 @@
           <a:p>
             <a:fld id="{52F7EFB8-6C6E-5041-9270-6951BF1704F9}" type="datetimeFigureOut">
               <a:rPr lang="en-US" smtClean="0"/>
-              <a:t>8/8/20</a:t>
+              <a:t>11/2/20</a:t>
             </a:fld>
             <a:endParaRPr lang="en-US"/>
           </a:p>
@@ -1724,7 +1724,7 @@
           <a:p>
             <a:fld id="{52F7EFB8-6C6E-5041-9270-6951BF1704F9}" type="datetimeFigureOut">
               <a:rPr lang="en-US" smtClean="0"/>
-              <a:t>8/8/20</a:t>
+              <a:t>11/2/20</a:t>
             </a:fld>
             <a:endParaRPr lang="en-US"/>
           </a:p>
@@ -1819,7 +1819,7 @@
           <a:p>
             <a:fld id="{52F7EFB8-6C6E-5041-9270-6951BF1704F9}" type="datetimeFigureOut">
               <a:rPr lang="en-US" smtClean="0"/>
-              <a:t>8/8/20</a:t>
+              <a:t>11/2/20</a:t>
             </a:fld>
             <a:endParaRPr lang="en-US"/>
           </a:p>
@@ -2096,7 +2096,7 @@
           <a:p>
             <a:fld id="{52F7EFB8-6C6E-5041-9270-6951BF1704F9}" type="datetimeFigureOut">
               <a:rPr lang="en-US" smtClean="0"/>
-              <a:t>8/8/20</a:t>
+              <a:t>11/2/20</a:t>
             </a:fld>
             <a:endParaRPr lang="en-US"/>
           </a:p>
@@ -2353,7 +2353,7 @@
           <a:p>
             <a:fld id="{52F7EFB8-6C6E-5041-9270-6951BF1704F9}" type="datetimeFigureOut">
               <a:rPr lang="en-US" smtClean="0"/>
-              <a:t>8/8/20</a:t>
+              <a:t>11/2/20</a:t>
             </a:fld>
             <a:endParaRPr lang="en-US"/>
           </a:p>
@@ -2566,7 +2566,7 @@
           <a:p>
             <a:fld id="{52F7EFB8-6C6E-5041-9270-6951BF1704F9}" type="datetimeFigureOut">
               <a:rPr lang="en-US" smtClean="0"/>
-              <a:t>8/8/20</a:t>
+              <a:t>11/2/20</a:t>
             </a:fld>
             <a:endParaRPr lang="en-US"/>
           </a:p>

</xml_diff>

<commit_message>
update extirpated status in maps
</commit_message>
<xml_diff>
--- a/outputs/Fig1.pptx
+++ b/outputs/Fig1.pptx
@@ -243,7 +243,7 @@
           <a:p>
             <a:fld id="{52F7EFB8-6C6E-5041-9270-6951BF1704F9}" type="datetimeFigureOut">
               <a:rPr lang="en-US" smtClean="0"/>
-              <a:t>11/2/20</a:t>
+              <a:t>11/4/20</a:t>
             </a:fld>
             <a:endParaRPr lang="en-US"/>
           </a:p>
@@ -413,7 +413,7 @@
           <a:p>
             <a:fld id="{52F7EFB8-6C6E-5041-9270-6951BF1704F9}" type="datetimeFigureOut">
               <a:rPr lang="en-US" smtClean="0"/>
-              <a:t>11/2/20</a:t>
+              <a:t>11/4/20</a:t>
             </a:fld>
             <a:endParaRPr lang="en-US"/>
           </a:p>
@@ -593,7 +593,7 @@
           <a:p>
             <a:fld id="{52F7EFB8-6C6E-5041-9270-6951BF1704F9}" type="datetimeFigureOut">
               <a:rPr lang="en-US" smtClean="0"/>
-              <a:t>11/2/20</a:t>
+              <a:t>11/4/20</a:t>
             </a:fld>
             <a:endParaRPr lang="en-US"/>
           </a:p>
@@ -763,7 +763,7 @@
           <a:p>
             <a:fld id="{52F7EFB8-6C6E-5041-9270-6951BF1704F9}" type="datetimeFigureOut">
               <a:rPr lang="en-US" smtClean="0"/>
-              <a:t>11/2/20</a:t>
+              <a:t>11/4/20</a:t>
             </a:fld>
             <a:endParaRPr lang="en-US"/>
           </a:p>
@@ -1007,7 +1007,7 @@
           <a:p>
             <a:fld id="{52F7EFB8-6C6E-5041-9270-6951BF1704F9}" type="datetimeFigureOut">
               <a:rPr lang="en-US" smtClean="0"/>
-              <a:t>11/2/20</a:t>
+              <a:t>11/4/20</a:t>
             </a:fld>
             <a:endParaRPr lang="en-US"/>
           </a:p>
@@ -1239,7 +1239,7 @@
           <a:p>
             <a:fld id="{52F7EFB8-6C6E-5041-9270-6951BF1704F9}" type="datetimeFigureOut">
               <a:rPr lang="en-US" smtClean="0"/>
-              <a:t>11/2/20</a:t>
+              <a:t>11/4/20</a:t>
             </a:fld>
             <a:endParaRPr lang="en-US"/>
           </a:p>
@@ -1606,7 +1606,7 @@
           <a:p>
             <a:fld id="{52F7EFB8-6C6E-5041-9270-6951BF1704F9}" type="datetimeFigureOut">
               <a:rPr lang="en-US" smtClean="0"/>
-              <a:t>11/2/20</a:t>
+              <a:t>11/4/20</a:t>
             </a:fld>
             <a:endParaRPr lang="en-US"/>
           </a:p>
@@ -1724,7 +1724,7 @@
           <a:p>
             <a:fld id="{52F7EFB8-6C6E-5041-9270-6951BF1704F9}" type="datetimeFigureOut">
               <a:rPr lang="en-US" smtClean="0"/>
-              <a:t>11/2/20</a:t>
+              <a:t>11/4/20</a:t>
             </a:fld>
             <a:endParaRPr lang="en-US"/>
           </a:p>
@@ -1819,7 +1819,7 @@
           <a:p>
             <a:fld id="{52F7EFB8-6C6E-5041-9270-6951BF1704F9}" type="datetimeFigureOut">
               <a:rPr lang="en-US" smtClean="0"/>
-              <a:t>11/2/20</a:t>
+              <a:t>11/4/20</a:t>
             </a:fld>
             <a:endParaRPr lang="en-US"/>
           </a:p>
@@ -2096,7 +2096,7 @@
           <a:p>
             <a:fld id="{52F7EFB8-6C6E-5041-9270-6951BF1704F9}" type="datetimeFigureOut">
               <a:rPr lang="en-US" smtClean="0"/>
-              <a:t>11/2/20</a:t>
+              <a:t>11/4/20</a:t>
             </a:fld>
             <a:endParaRPr lang="en-US"/>
           </a:p>
@@ -2353,7 +2353,7 @@
           <a:p>
             <a:fld id="{52F7EFB8-6C6E-5041-9270-6951BF1704F9}" type="datetimeFigureOut">
               <a:rPr lang="en-US" smtClean="0"/>
-              <a:t>11/2/20</a:t>
+              <a:t>11/4/20</a:t>
             </a:fld>
             <a:endParaRPr lang="en-US"/>
           </a:p>
@@ -2566,7 +2566,7 @@
           <a:p>
             <a:fld id="{52F7EFB8-6C6E-5041-9270-6951BF1704F9}" type="datetimeFigureOut">
               <a:rPr lang="en-US" smtClean="0"/>
-              <a:t>11/2/20</a:t>
+              <a:t>11/4/20</a:t>
             </a:fld>
             <a:endParaRPr lang="en-US"/>
           </a:p>

</xml_diff>

<commit_message>
Figure updates to include dam
</commit_message>
<xml_diff>
--- a/outputs/Fig1.pptx
+++ b/outputs/Fig1.pptx
@@ -243,7 +243,7 @@
           <a:p>
             <a:fld id="{52F7EFB8-6C6E-5041-9270-6951BF1704F9}" type="datetimeFigureOut">
               <a:rPr lang="en-US" smtClean="0"/>
-              <a:t>11/4/20</a:t>
+              <a:t>11/20/20</a:t>
             </a:fld>
             <a:endParaRPr lang="en-US"/>
           </a:p>
@@ -413,7 +413,7 @@
           <a:p>
             <a:fld id="{52F7EFB8-6C6E-5041-9270-6951BF1704F9}" type="datetimeFigureOut">
               <a:rPr lang="en-US" smtClean="0"/>
-              <a:t>11/4/20</a:t>
+              <a:t>11/20/20</a:t>
             </a:fld>
             <a:endParaRPr lang="en-US"/>
           </a:p>
@@ -593,7 +593,7 @@
           <a:p>
             <a:fld id="{52F7EFB8-6C6E-5041-9270-6951BF1704F9}" type="datetimeFigureOut">
               <a:rPr lang="en-US" smtClean="0"/>
-              <a:t>11/4/20</a:t>
+              <a:t>11/20/20</a:t>
             </a:fld>
             <a:endParaRPr lang="en-US"/>
           </a:p>
@@ -763,7 +763,7 @@
           <a:p>
             <a:fld id="{52F7EFB8-6C6E-5041-9270-6951BF1704F9}" type="datetimeFigureOut">
               <a:rPr lang="en-US" smtClean="0"/>
-              <a:t>11/4/20</a:t>
+              <a:t>11/20/20</a:t>
             </a:fld>
             <a:endParaRPr lang="en-US"/>
           </a:p>
@@ -1007,7 +1007,7 @@
           <a:p>
             <a:fld id="{52F7EFB8-6C6E-5041-9270-6951BF1704F9}" type="datetimeFigureOut">
               <a:rPr lang="en-US" smtClean="0"/>
-              <a:t>11/4/20</a:t>
+              <a:t>11/20/20</a:t>
             </a:fld>
             <a:endParaRPr lang="en-US"/>
           </a:p>
@@ -1239,7 +1239,7 @@
           <a:p>
             <a:fld id="{52F7EFB8-6C6E-5041-9270-6951BF1704F9}" type="datetimeFigureOut">
               <a:rPr lang="en-US" smtClean="0"/>
-              <a:t>11/4/20</a:t>
+              <a:t>11/20/20</a:t>
             </a:fld>
             <a:endParaRPr lang="en-US"/>
           </a:p>
@@ -1606,7 +1606,7 @@
           <a:p>
             <a:fld id="{52F7EFB8-6C6E-5041-9270-6951BF1704F9}" type="datetimeFigureOut">
               <a:rPr lang="en-US" smtClean="0"/>
-              <a:t>11/4/20</a:t>
+              <a:t>11/20/20</a:t>
             </a:fld>
             <a:endParaRPr lang="en-US"/>
           </a:p>
@@ -1724,7 +1724,7 @@
           <a:p>
             <a:fld id="{52F7EFB8-6C6E-5041-9270-6951BF1704F9}" type="datetimeFigureOut">
               <a:rPr lang="en-US" smtClean="0"/>
-              <a:t>11/4/20</a:t>
+              <a:t>11/20/20</a:t>
             </a:fld>
             <a:endParaRPr lang="en-US"/>
           </a:p>
@@ -1819,7 +1819,7 @@
           <a:p>
             <a:fld id="{52F7EFB8-6C6E-5041-9270-6951BF1704F9}" type="datetimeFigureOut">
               <a:rPr lang="en-US" smtClean="0"/>
-              <a:t>11/4/20</a:t>
+              <a:t>11/20/20</a:t>
             </a:fld>
             <a:endParaRPr lang="en-US"/>
           </a:p>
@@ -2096,7 +2096,7 @@
           <a:p>
             <a:fld id="{52F7EFB8-6C6E-5041-9270-6951BF1704F9}" type="datetimeFigureOut">
               <a:rPr lang="en-US" smtClean="0"/>
-              <a:t>11/4/20</a:t>
+              <a:t>11/20/20</a:t>
             </a:fld>
             <a:endParaRPr lang="en-US"/>
           </a:p>
@@ -2353,7 +2353,7 @@
           <a:p>
             <a:fld id="{52F7EFB8-6C6E-5041-9270-6951BF1704F9}" type="datetimeFigureOut">
               <a:rPr lang="en-US" smtClean="0"/>
-              <a:t>11/4/20</a:t>
+              <a:t>11/20/20</a:t>
             </a:fld>
             <a:endParaRPr lang="en-US"/>
           </a:p>
@@ -2566,7 +2566,7 @@
           <a:p>
             <a:fld id="{52F7EFB8-6C6E-5041-9270-6951BF1704F9}" type="datetimeFigureOut">
               <a:rPr lang="en-US" smtClean="0"/>
-              <a:t>11/4/20</a:t>
+              <a:t>11/20/20</a:t>
             </a:fld>
             <a:endParaRPr lang="en-US"/>
           </a:p>

</xml_diff>

<commit_message>
update herds to 2021 data and add historic ranges
</commit_message>
<xml_diff>
--- a/outputs/Fig1.pptx
+++ b/outputs/Fig1.pptx
@@ -243,7 +243,7 @@
           <a:p>
             <a:fld id="{52F7EFB8-6C6E-5041-9270-6951BF1704F9}" type="datetimeFigureOut">
               <a:rPr lang="en-US" smtClean="0"/>
-              <a:t>11/20/20</a:t>
+              <a:t>6/4/21</a:t>
             </a:fld>
             <a:endParaRPr lang="en-US"/>
           </a:p>
@@ -413,7 +413,7 @@
           <a:p>
             <a:fld id="{52F7EFB8-6C6E-5041-9270-6951BF1704F9}" type="datetimeFigureOut">
               <a:rPr lang="en-US" smtClean="0"/>
-              <a:t>11/20/20</a:t>
+              <a:t>6/4/21</a:t>
             </a:fld>
             <a:endParaRPr lang="en-US"/>
           </a:p>
@@ -593,7 +593,7 @@
           <a:p>
             <a:fld id="{52F7EFB8-6C6E-5041-9270-6951BF1704F9}" type="datetimeFigureOut">
               <a:rPr lang="en-US" smtClean="0"/>
-              <a:t>11/20/20</a:t>
+              <a:t>6/4/21</a:t>
             </a:fld>
             <a:endParaRPr lang="en-US"/>
           </a:p>
@@ -763,7 +763,7 @@
           <a:p>
             <a:fld id="{52F7EFB8-6C6E-5041-9270-6951BF1704F9}" type="datetimeFigureOut">
               <a:rPr lang="en-US" smtClean="0"/>
-              <a:t>11/20/20</a:t>
+              <a:t>6/4/21</a:t>
             </a:fld>
             <a:endParaRPr lang="en-US"/>
           </a:p>
@@ -1007,7 +1007,7 @@
           <a:p>
             <a:fld id="{52F7EFB8-6C6E-5041-9270-6951BF1704F9}" type="datetimeFigureOut">
               <a:rPr lang="en-US" smtClean="0"/>
-              <a:t>11/20/20</a:t>
+              <a:t>6/4/21</a:t>
             </a:fld>
             <a:endParaRPr lang="en-US"/>
           </a:p>
@@ -1239,7 +1239,7 @@
           <a:p>
             <a:fld id="{52F7EFB8-6C6E-5041-9270-6951BF1704F9}" type="datetimeFigureOut">
               <a:rPr lang="en-US" smtClean="0"/>
-              <a:t>11/20/20</a:t>
+              <a:t>6/4/21</a:t>
             </a:fld>
             <a:endParaRPr lang="en-US"/>
           </a:p>
@@ -1606,7 +1606,7 @@
           <a:p>
             <a:fld id="{52F7EFB8-6C6E-5041-9270-6951BF1704F9}" type="datetimeFigureOut">
               <a:rPr lang="en-US" smtClean="0"/>
-              <a:t>11/20/20</a:t>
+              <a:t>6/4/21</a:t>
             </a:fld>
             <a:endParaRPr lang="en-US"/>
           </a:p>
@@ -1724,7 +1724,7 @@
           <a:p>
             <a:fld id="{52F7EFB8-6C6E-5041-9270-6951BF1704F9}" type="datetimeFigureOut">
               <a:rPr lang="en-US" smtClean="0"/>
-              <a:t>11/20/20</a:t>
+              <a:t>6/4/21</a:t>
             </a:fld>
             <a:endParaRPr lang="en-US"/>
           </a:p>
@@ -1819,7 +1819,7 @@
           <a:p>
             <a:fld id="{52F7EFB8-6C6E-5041-9270-6951BF1704F9}" type="datetimeFigureOut">
               <a:rPr lang="en-US" smtClean="0"/>
-              <a:t>11/20/20</a:t>
+              <a:t>6/4/21</a:t>
             </a:fld>
             <a:endParaRPr lang="en-US"/>
           </a:p>
@@ -2096,7 +2096,7 @@
           <a:p>
             <a:fld id="{52F7EFB8-6C6E-5041-9270-6951BF1704F9}" type="datetimeFigureOut">
               <a:rPr lang="en-US" smtClean="0"/>
-              <a:t>11/20/20</a:t>
+              <a:t>6/4/21</a:t>
             </a:fld>
             <a:endParaRPr lang="en-US"/>
           </a:p>
@@ -2353,7 +2353,7 @@
           <a:p>
             <a:fld id="{52F7EFB8-6C6E-5041-9270-6951BF1704F9}" type="datetimeFigureOut">
               <a:rPr lang="en-US" smtClean="0"/>
-              <a:t>11/20/20</a:t>
+              <a:t>6/4/21</a:t>
             </a:fld>
             <a:endParaRPr lang="en-US"/>
           </a:p>
@@ -2566,7 +2566,7 @@
           <a:p>
             <a:fld id="{52F7EFB8-6C6E-5041-9270-6951BF1704F9}" type="datetimeFigureOut">
               <a:rPr lang="en-US" smtClean="0"/>
-              <a:t>11/20/20</a:t>
+              <a:t>6/4/21</a:t>
             </a:fld>
             <a:endParaRPr lang="en-US"/>
           </a:p>
@@ -3062,10 +3062,10 @@
       </p:pic>
       <p:pic>
         <p:nvPicPr>
-          <p:cNvPr id="9" name="Picture 8">
+          <p:cNvPr id="11" name="Picture 10">
             <a:extLst>
               <a:ext uri="{FF2B5EF4-FFF2-40B4-BE49-F238E27FC236}">
-                <a16:creationId xmlns:a16="http://schemas.microsoft.com/office/drawing/2014/main" id="{1F083276-F61A-0045-B8FE-032ACCC2F1A1}"/>
+                <a16:creationId xmlns:a16="http://schemas.microsoft.com/office/drawing/2014/main" id="{E0252605-7EC5-C04A-BF96-6FF8D81BD7B0}"/>
               </a:ext>
             </a:extLst>
           </p:cNvPr>
@@ -3076,13 +3076,14 @@
         </p:nvPicPr>
         <p:blipFill>
           <a:blip r:embed="rId3"/>
-          <a:srcRect/>
-          <a:stretch/>
+          <a:stretch>
+            <a:fillRect/>
+          </a:stretch>
         </p:blipFill>
         <p:spPr>
           <a:xfrm>
-            <a:off x="145941" y="6189148"/>
-            <a:ext cx="6907427" cy="637608"/>
+            <a:off x="-2" y="6230495"/>
+            <a:ext cx="7199313" cy="575945"/>
           </a:xfrm>
           <a:prstGeom prst="rect">
             <a:avLst/>

</xml_diff>